<commit_message>
WIP: text in pptx part 2
</commit_message>
<xml_diff>
--- a/tests/gen_figure.pptx
+++ b/tests/gen_figure.pptx
@@ -7,7 +7,7 @@
   <p:sldIdLst>
     <p:sldId id="256" r:id="rId7"/>
   </p:sldIdLst>
-  <p:sldSz cx="10080005" cy="8229600" type="screen4x3"/>
+  <p:sldSz cx="14630400" cy="8229600" type="screen4x3"/>
   <p:notesSz cx="6858000" cy="9144000"/>
   <p:defaultTextStyle>
     <a:defPPr>
@@ -3104,7 +3104,7 @@
         </p:blipFill>
         <p:spPr>
           <a:xfrm>
-            <a:off x="0" y="26125"/>
+            <a:off x="0" y="444137"/>
             <a:ext cx="7286461" cy="7286461"/>
           </a:xfrm>
           <a:prstGeom prst="rect">
@@ -3128,7 +3128,7 @@
         </p:blipFill>
         <p:spPr>
           <a:xfrm>
-            <a:off x="7338713" y="26125"/>
+            <a:off x="7338713" y="444137"/>
             <a:ext cx="7286461" cy="7286461"/>
           </a:xfrm>
           <a:prstGeom prst="rect">
@@ -3144,7 +3144,7 @@
         </p:nvSpPr>
         <p:spPr>
           <a:xfrm>
-            <a:off x="7338713" y="26125"/>
+            <a:off x="7338713" y="444137"/>
             <a:ext cx="7286461" cy="7286461"/>
           </a:xfrm>
           <a:prstGeom prst="rect">
@@ -3177,6 +3177,56 @@
           <a:lstStyle/>
           <a:p>
             <a:pPr algn="ctr"/>
+          </a:p>
+        </p:txBody>
+      </p:sp>
+      <p:sp>
+        <p:nvSpPr>
+          <p:cNvPr id="5" name="Rectangle 4"/>
+          <p:cNvSpPr/>
+          <p:nvPr/>
+        </p:nvSpPr>
+        <p:spPr>
+          <a:xfrm>
+            <a:off x="0" y="26125"/>
+            <a:ext cx="14625174" cy="418011"/>
+          </a:xfrm>
+          <a:prstGeom prst="rect">
+            <a:avLst/>
+          </a:prstGeom>
+          <a:noFill/>
+          <a:ln>
+            <a:noFill/>
+          </a:ln>
+          <a:effectLst/>
+        </p:spPr>
+        <p:style>
+          <a:lnRef idx="1">
+            <a:schemeClr val="accent1"/>
+          </a:lnRef>
+          <a:fillRef idx="3">
+            <a:schemeClr val="accent1"/>
+          </a:fillRef>
+          <a:effectRef idx="2">
+            <a:schemeClr val="accent1"/>
+          </a:effectRef>
+          <a:fontRef idx="minor">
+            <a:schemeClr val="lt1"/>
+          </a:fontRef>
+        </p:style>
+        <p:txBody>
+          <a:bodyPr rtlCol="0" anchor="ctr"/>
+          <a:lstStyle/>
+          <a:p>
+            <a:pPr algn="ctr"/>
+            <a:r>
+              <a:rPr sz="800">
+                <a:solidFill>
+                  <a:srgbClr val="000000"/>
+                </a:solidFill>
+              </a:rPr>
+              <a:t>North Title</a:t>
+            </a:r>
           </a:p>
         </p:txBody>
       </p:sp>

</xml_diff>

<commit_message>
pptx backend text finished
</commit_message>
<xml_diff>
--- a/tests/gen_figure.pptx
+++ b/tests/gen_figure.pptx
@@ -7,7 +7,7 @@
   <p:sldIdLst>
     <p:sldId id="256" r:id="rId7"/>
   </p:sldIdLst>
-  <p:sldSz cx="14630400" cy="8229600" type="screen4x3"/>
+  <p:sldSz cx="6480003" cy="1807200" type="screen4x3"/>
   <p:notesSz cx="6858000" cy="9144000"/>
   <p:defaultTextStyle>
     <a:defPPr>
@@ -3104,8 +3104,8 @@
         </p:blipFill>
         <p:spPr>
           <a:xfrm>
-            <a:off x="0" y="444137"/>
-            <a:ext cx="7286461" cy="7286461"/>
+            <a:off x="0" y="306000"/>
+            <a:ext cx="1429200" cy="714600"/>
           </a:xfrm>
           <a:prstGeom prst="rect">
             <a:avLst/>
@@ -3128,8 +3128,8 @@
         </p:blipFill>
         <p:spPr>
           <a:xfrm>
-            <a:off x="7338713" y="444137"/>
-            <a:ext cx="7286461" cy="7286461"/>
+            <a:off x="1465200" y="306000"/>
+            <a:ext cx="1429200" cy="714600"/>
           </a:xfrm>
           <a:prstGeom prst="rect">
             <a:avLst/>
@@ -3144,8 +3144,8 @@
         </p:nvSpPr>
         <p:spPr>
           <a:xfrm>
-            <a:off x="7338713" y="444137"/>
-            <a:ext cx="7286461" cy="7286461"/>
+            <a:off x="1465200" y="306000"/>
+            <a:ext cx="1429200" cy="714600"/>
           </a:xfrm>
           <a:prstGeom prst="rect">
             <a:avLst/>
@@ -3180,16 +3180,108 @@
           </a:p>
         </p:txBody>
       </p:sp>
-      <p:sp>
-        <p:nvSpPr>
-          <p:cNvPr id="5" name="Rectangle 4"/>
+      <p:pic>
+        <p:nvPicPr>
+          <p:cNvPr id="5" name="Picture 4" descr="image-1-1.png"/>
+          <p:cNvPicPr>
+            <a:picLocks noChangeAspect="1"/>
+          </p:cNvPicPr>
+          <p:nvPr/>
+        </p:nvPicPr>
+        <p:blipFill>
+          <a:blip r:embed="rId2"/>
+          <a:stretch>
+            <a:fillRect/>
+          </a:stretch>
+        </p:blipFill>
+        <p:spPr>
+          <a:xfrm>
+            <a:off x="0" y="1092600"/>
+            <a:ext cx="1429200" cy="714600"/>
+          </a:xfrm>
+          <a:prstGeom prst="rect">
+            <a:avLst/>
+          </a:prstGeom>
+        </p:spPr>
+      </p:pic>
+      <p:pic>
+        <p:nvPicPr>
+          <p:cNvPr id="6" name="Picture 5" descr="image-1-2.png"/>
+          <p:cNvPicPr>
+            <a:picLocks noChangeAspect="1"/>
+          </p:cNvPicPr>
+          <p:nvPr/>
+        </p:nvPicPr>
+        <p:blipFill>
+          <a:blip r:embed="rId3"/>
+          <a:stretch>
+            <a:fillRect/>
+          </a:stretch>
+        </p:blipFill>
+        <p:spPr>
+          <a:xfrm>
+            <a:off x="1465200" y="1092600"/>
+            <a:ext cx="1429200" cy="714600"/>
+          </a:xfrm>
+          <a:prstGeom prst="rect">
+            <a:avLst/>
+          </a:prstGeom>
+        </p:spPr>
+      </p:pic>
+      <p:sp>
+        <p:nvSpPr>
+          <p:cNvPr id="7" name="Rectangle 6"/>
           <p:cNvSpPr/>
           <p:nvPr/>
         </p:nvSpPr>
         <p:spPr>
           <a:xfrm>
-            <a:off x="0" y="26125"/>
-            <a:ext cx="14625174" cy="418011"/>
+            <a:off x="1465200" y="1092600"/>
+            <a:ext cx="1429200" cy="714600"/>
+          </a:xfrm>
+          <a:prstGeom prst="rect">
+            <a:avLst/>
+          </a:prstGeom>
+          <a:noFill/>
+          <a:ln w="12700">
+            <a:solidFill>
+              <a:srgbClr val="32E60A"/>
+            </a:solidFill>
+          </a:ln>
+          <a:effectLst/>
+        </p:spPr>
+        <p:style>
+          <a:lnRef idx="1">
+            <a:schemeClr val="accent1"/>
+          </a:lnRef>
+          <a:fillRef idx="3">
+            <a:schemeClr val="accent1"/>
+          </a:fillRef>
+          <a:effectRef idx="2">
+            <a:schemeClr val="accent1"/>
+          </a:effectRef>
+          <a:fontRef idx="minor">
+            <a:schemeClr val="lt1"/>
+          </a:fontRef>
+        </p:style>
+        <p:txBody>
+          <a:bodyPr rtlCol="0" anchor="ctr"/>
+          <a:lstStyle/>
+          <a:p>
+            <a:pPr algn="ctr"/>
+          </a:p>
+        </p:txBody>
+      </p:sp>
+      <p:sp>
+        <p:nvSpPr>
+          <p:cNvPr id="8" name="Rectangle 7"/>
+          <p:cNvSpPr/>
+          <p:nvPr/>
+        </p:nvSpPr>
+        <p:spPr>
+          <a:xfrm>
+            <a:off x="0" y="18000"/>
+            <a:ext cx="2894401" cy="288000"/>
           </a:xfrm>
           <a:prstGeom prst="rect">
             <a:avLst/>
@@ -3226,6 +3318,236 @@
                 </a:solidFill>
               </a:rPr>
               <a:t>North Title</a:t>
+            </a:r>
+          </a:p>
+        </p:txBody>
+      </p:sp>
+      <p:sp>
+        <p:nvSpPr>
+          <p:cNvPr id="9" name="Rectangle 8"/>
+          <p:cNvSpPr/>
+          <p:nvPr/>
+        </p:nvSpPr>
+        <p:spPr>
+          <a:xfrm rot="16200000">
+            <a:off x="2681101" y="519300"/>
+            <a:ext cx="714600" cy="288000"/>
+          </a:xfrm>
+          <a:prstGeom prst="rect">
+            <a:avLst/>
+          </a:prstGeom>
+          <a:solidFill>
+            <a:srgbClr val="FFFFFF"/>
+          </a:solidFill>
+          <a:ln>
+            <a:noFill/>
+          </a:ln>
+          <a:effectLst/>
+        </p:spPr>
+        <p:style>
+          <a:lnRef idx="1">
+            <a:schemeClr val="accent1"/>
+          </a:lnRef>
+          <a:fillRef idx="3">
+            <a:schemeClr val="accent1"/>
+          </a:fillRef>
+          <a:effectRef idx="2">
+            <a:schemeClr val="accent1"/>
+          </a:effectRef>
+          <a:fontRef idx="minor">
+            <a:schemeClr val="lt1"/>
+          </a:fontRef>
+        </p:style>
+        <p:txBody>
+          <a:bodyPr rtlCol="0" anchor="ctr"/>
+          <a:lstStyle/>
+          <a:p>
+            <a:pPr algn="ctr"/>
+            <a:r>
+              <a:rPr sz="700">
+                <a:solidFill>
+                  <a:srgbClr val="000000"/>
+                </a:solidFill>
+              </a:rPr>
+              <a:t>Awesome pictures 1</a:t>
+            </a:r>
+          </a:p>
+        </p:txBody>
+      </p:sp>
+      <p:sp>
+        <p:nvSpPr>
+          <p:cNvPr id="10" name="Rectangle 9"/>
+          <p:cNvSpPr/>
+          <p:nvPr/>
+        </p:nvSpPr>
+        <p:spPr>
+          <a:xfrm rot="16200000">
+            <a:off x="2681101" y="1305900"/>
+            <a:ext cx="714600" cy="288000"/>
+          </a:xfrm>
+          <a:prstGeom prst="rect">
+            <a:avLst/>
+          </a:prstGeom>
+          <a:solidFill>
+            <a:srgbClr val="FFFFFF"/>
+          </a:solidFill>
+          <a:ln>
+            <a:noFill/>
+          </a:ln>
+          <a:effectLst/>
+        </p:spPr>
+        <p:style>
+          <a:lnRef idx="1">
+            <a:schemeClr val="accent1"/>
+          </a:lnRef>
+          <a:fillRef idx="3">
+            <a:schemeClr val="accent1"/>
+          </a:fillRef>
+          <a:effectRef idx="2">
+            <a:schemeClr val="accent1"/>
+          </a:effectRef>
+          <a:fontRef idx="minor">
+            <a:schemeClr val="lt1"/>
+          </a:fontRef>
+        </p:style>
+        <p:txBody>
+          <a:bodyPr rtlCol="0" anchor="ctr"/>
+          <a:lstStyle/>
+          <a:p>
+            <a:pPr algn="ctr"/>
+            <a:r>
+              <a:rPr sz="700">
+                <a:solidFill>
+                  <a:srgbClr val="000000"/>
+                </a:solidFill>
+              </a:rPr>
+              <a:t>Awesome pictures 2</a:t>
+            </a:r>
+          </a:p>
+        </p:txBody>
+      </p:sp>
+      <p:pic>
+        <p:nvPicPr>
+          <p:cNvPr id="11" name="Picture 10" descr="image-1-1.png"/>
+          <p:cNvPicPr>
+            <a:picLocks noChangeAspect="1"/>
+          </p:cNvPicPr>
+          <p:nvPr/>
+        </p:nvPicPr>
+        <p:blipFill>
+          <a:blip r:embed="rId2"/>
+          <a:stretch>
+            <a:fillRect/>
+          </a:stretch>
+        </p:blipFill>
+        <p:spPr>
+          <a:xfrm>
+            <a:off x="3186001" y="306000"/>
+            <a:ext cx="3002401" cy="1501200"/>
+          </a:xfrm>
+          <a:prstGeom prst="rect">
+            <a:avLst/>
+          </a:prstGeom>
+        </p:spPr>
+      </p:pic>
+      <p:sp>
+        <p:nvSpPr>
+          <p:cNvPr id="12" name="Rectangle 11"/>
+          <p:cNvSpPr/>
+          <p:nvPr/>
+        </p:nvSpPr>
+        <p:spPr>
+          <a:xfrm>
+            <a:off x="3186001" y="18000"/>
+            <a:ext cx="3002401" cy="288000"/>
+          </a:xfrm>
+          <a:prstGeom prst="rect">
+            <a:avLst/>
+          </a:prstGeom>
+          <a:noFill/>
+          <a:ln>
+            <a:noFill/>
+          </a:ln>
+          <a:effectLst/>
+        </p:spPr>
+        <p:style>
+          <a:lnRef idx="1">
+            <a:schemeClr val="accent1"/>
+          </a:lnRef>
+          <a:fillRef idx="3">
+            <a:schemeClr val="accent1"/>
+          </a:fillRef>
+          <a:effectRef idx="2">
+            <a:schemeClr val="accent1"/>
+          </a:effectRef>
+          <a:fontRef idx="minor">
+            <a:schemeClr val="lt1"/>
+          </a:fontRef>
+        </p:style>
+        <p:txBody>
+          <a:bodyPr rtlCol="0" anchor="ctr"/>
+          <a:lstStyle/>
+          <a:p>
+            <a:pPr algn="ctr"/>
+            <a:r>
+              <a:rPr sz="800">
+                <a:solidFill>
+                  <a:srgbClr val="000000"/>
+                </a:solidFill>
+              </a:rPr>
+              <a:t>North Title</a:t>
+            </a:r>
+          </a:p>
+        </p:txBody>
+      </p:sp>
+      <p:sp>
+        <p:nvSpPr>
+          <p:cNvPr id="13" name="Rectangle 12"/>
+          <p:cNvSpPr/>
+          <p:nvPr/>
+        </p:nvSpPr>
+        <p:spPr>
+          <a:xfrm rot="16200000">
+            <a:off x="5581803" y="912600"/>
+            <a:ext cx="1501200" cy="288000"/>
+          </a:xfrm>
+          <a:prstGeom prst="rect">
+            <a:avLst/>
+          </a:prstGeom>
+          <a:solidFill>
+            <a:srgbClr val="FFFFFF"/>
+          </a:solidFill>
+          <a:ln>
+            <a:noFill/>
+          </a:ln>
+          <a:effectLst/>
+        </p:spPr>
+        <p:style>
+          <a:lnRef idx="1">
+            <a:schemeClr val="accent1"/>
+          </a:lnRef>
+          <a:fillRef idx="3">
+            <a:schemeClr val="accent1"/>
+          </a:fillRef>
+          <a:effectRef idx="2">
+            <a:schemeClr val="accent1"/>
+          </a:effectRef>
+          <a:fontRef idx="minor">
+            <a:schemeClr val="lt1"/>
+          </a:fontRef>
+        </p:style>
+        <p:txBody>
+          <a:bodyPr rtlCol="0" anchor="ctr"/>
+          <a:lstStyle/>
+          <a:p>
+            <a:pPr algn="ctr"/>
+            <a:r>
+              <a:rPr sz="700">
+                <a:solidFill>
+                  <a:srgbClr val="000000"/>
+                </a:solidFill>
+              </a:rPr>
+              <a:t>Awesome pictures 1</a:t>
             </a:r>
           </a:p>
         </p:txBody>

</xml_diff>

<commit_message>
text margins in pptx fixed
</commit_message>
<xml_diff>
--- a/tests/gen_figure.pptx
+++ b/tests/gen_figure.pptx
@@ -3307,7 +3307,7 @@
           </a:fontRef>
         </p:style>
         <p:txBody>
-          <a:bodyPr rtlCol="0" anchor="ctr"/>
+          <a:bodyPr rtlCol="0" anchor="ctr" lIns="0" tIns="0" bIns="0" rIns="0"/>
           <a:lstStyle/>
           <a:p>
             <a:pPr algn="ctr"/>
@@ -3359,7 +3359,7 @@
           </a:fontRef>
         </p:style>
         <p:txBody>
-          <a:bodyPr rtlCol="0" anchor="ctr"/>
+          <a:bodyPr rtlCol="0" anchor="ctr" lIns="0" tIns="0" bIns="0" rIns="0"/>
           <a:lstStyle/>
           <a:p>
             <a:pPr algn="ctr"/>
@@ -3411,7 +3411,7 @@
           </a:fontRef>
         </p:style>
         <p:txBody>
-          <a:bodyPr rtlCol="0" anchor="ctr"/>
+          <a:bodyPr rtlCol="0" anchor="ctr" lIns="0" tIns="0" bIns="0" rIns="0"/>
           <a:lstStyle/>
           <a:p>
             <a:pPr algn="ctr"/>
@@ -3485,7 +3485,7 @@
           </a:fontRef>
         </p:style>
         <p:txBody>
-          <a:bodyPr rtlCol="0" anchor="ctr"/>
+          <a:bodyPr rtlCol="0" anchor="ctr" lIns="0" tIns="0" bIns="0" rIns="0"/>
           <a:lstStyle/>
           <a:p>
             <a:pPr algn="ctr"/>
@@ -3537,7 +3537,7 @@
           </a:fontRef>
         </p:style>
         <p:txBody>
-          <a:bodyPr rtlCol="0" anchor="ctr"/>
+          <a:bodyPr rtlCol="0" anchor="ctr" lIns="0" tIns="0" bIns="0" rIns="0"/>
           <a:lstStyle/>
           <a:p>
             <a:pPr algn="ctr"/>

</xml_diff>